<commit_message>
Adding footprints without animation
</commit_message>
<xml_diff>
--- a/master_template.pptx
+++ b/master_template.pptx
@@ -109,7 +109,18 @@
   </p:defaultTextStyle>
   <p:extLst>
     <p:ext uri="{EFAFB233-063F-42B5-8137-9DF3F51BA10A}">
-      <p15:sldGuideLst xmlns:p15="http://schemas.microsoft.com/office/powerpoint/2012/main" xmlns=""/>
+      <p15:sldGuideLst xmlns:p15="http://schemas.microsoft.com/office/powerpoint/2012/main">
+        <p15:guide id="1" orient="horz" pos="2160">
+          <p15:clr>
+            <a:srgbClr val="A4A3A4"/>
+          </p15:clr>
+        </p15:guide>
+        <p15:guide id="2" pos="3840">
+          <p15:clr>
+            <a:srgbClr val="A4A3A4"/>
+          </p15:clr>
+        </p15:guide>
+      </p15:sldGuideLst>
     </p:ext>
   </p:extLst>
 </p:presentation>
@@ -197,7 +208,7 @@
           <a:p>
             <a:fld id="{5DBDFAF8-9CD3-4716-8CF2-6121A8FDDE9B}" type="datetimeFigureOut">
               <a:rPr lang="en-US" smtClean="0"/>
-              <a:t>16/07/18</a:t>
+              <a:t>9/27/2018</a:t>
             </a:fld>
             <a:endParaRPr lang="en-US"/>
           </a:p>
@@ -261,38 +272,37 @@
           <a:p>
             <a:pPr lvl="0"/>
             <a:r>
-              <a:rPr lang="en-US" smtClean="0"/>
+              <a:rPr lang="en-US"/>
               <a:t>Edit Master text styles</a:t>
             </a:r>
           </a:p>
           <a:p>
             <a:pPr lvl="1"/>
             <a:r>
-              <a:rPr lang="en-US" smtClean="0"/>
+              <a:rPr lang="en-US"/>
               <a:t>Second level</a:t>
             </a:r>
           </a:p>
           <a:p>
             <a:pPr lvl="2"/>
             <a:r>
-              <a:rPr lang="en-US" smtClean="0"/>
+              <a:rPr lang="en-US"/>
               <a:t>Third level</a:t>
             </a:r>
           </a:p>
           <a:p>
             <a:pPr lvl="3"/>
             <a:r>
-              <a:rPr lang="en-US" smtClean="0"/>
+              <a:rPr lang="en-US"/>
               <a:t>Fourth level</a:t>
             </a:r>
           </a:p>
           <a:p>
             <a:pPr lvl="4"/>
             <a:r>
-              <a:rPr lang="en-US" smtClean="0"/>
+              <a:rPr lang="en-US"/>
               <a:t>Fifth level</a:t>
             </a:r>
-            <a:endParaRPr lang="en-US"/>
           </a:p>
         </p:txBody>
       </p:sp>
@@ -527,7 +537,7 @@
               <a:defRPr/>
             </a:pPr>
             <a:r>
-              <a:rPr lang="en-US" dirty="0" smtClean="0"/>
+              <a:rPr lang="en-US" dirty="0"/>
               <a:t>Americas Cup 2018. Race 2a</a:t>
             </a:r>
           </a:p>
@@ -610,7 +620,7 @@
           <a:lstStyle/>
           <a:p>
             <a:r>
-              <a:rPr lang="en-GB" smtClean="0"/>
+              <a:rPr lang="en-GB"/>
               <a:t>Click to edit Master title style</a:t>
             </a:r>
             <a:endParaRPr lang="en-US"/>
@@ -729,7 +739,7 @@
           </a:lstStyle>
           <a:p>
             <a:r>
-              <a:rPr lang="en-GB" smtClean="0"/>
+              <a:rPr lang="en-GB"/>
               <a:t>Click to edit Master subtitle style</a:t>
             </a:r>
             <a:endParaRPr lang="en-US"/>
@@ -753,7 +763,7 @@
           <a:p>
             <a:fld id="{07AF7C9C-3FFC-F543-8CD5-56B058077314}" type="datetimeFigureOut">
               <a:rPr lang="en-US" smtClean="0"/>
-              <a:t>16/07/18</a:t>
+              <a:t>9/27/2018</a:t>
             </a:fld>
             <a:endParaRPr lang="en-US"/>
           </a:p>
@@ -847,7 +857,7 @@
           <a:lstStyle/>
           <a:p>
             <a:r>
-              <a:rPr lang="en-GB" smtClean="0"/>
+              <a:rPr lang="en-GB"/>
               <a:t>Click to edit Master title style</a:t>
             </a:r>
             <a:endParaRPr lang="en-US"/>
@@ -871,35 +881,35 @@
           <a:p>
             <a:pPr lvl="0"/>
             <a:r>
-              <a:rPr lang="en-GB" smtClean="0"/>
+              <a:rPr lang="en-GB"/>
               <a:t>Click to edit Master text styles</a:t>
             </a:r>
           </a:p>
           <a:p>
             <a:pPr lvl="1"/>
             <a:r>
-              <a:rPr lang="en-GB" smtClean="0"/>
+              <a:rPr lang="en-GB"/>
               <a:t>Second level</a:t>
             </a:r>
           </a:p>
           <a:p>
             <a:pPr lvl="2"/>
             <a:r>
-              <a:rPr lang="en-GB" smtClean="0"/>
+              <a:rPr lang="en-GB"/>
               <a:t>Third level</a:t>
             </a:r>
           </a:p>
           <a:p>
             <a:pPr lvl="3"/>
             <a:r>
-              <a:rPr lang="en-GB" smtClean="0"/>
+              <a:rPr lang="en-GB"/>
               <a:t>Fourth level</a:t>
             </a:r>
           </a:p>
           <a:p>
             <a:pPr lvl="4"/>
             <a:r>
-              <a:rPr lang="en-GB" smtClean="0"/>
+              <a:rPr lang="en-GB"/>
               <a:t>Fifth level</a:t>
             </a:r>
             <a:endParaRPr lang="en-US"/>
@@ -923,7 +933,7 @@
           <a:p>
             <a:fld id="{07AF7C9C-3FFC-F543-8CD5-56B058077314}" type="datetimeFigureOut">
               <a:rPr lang="en-US" smtClean="0"/>
-              <a:t>16/07/18</a:t>
+              <a:t>9/27/2018</a:t>
             </a:fld>
             <a:endParaRPr lang="en-US"/>
           </a:p>
@@ -1022,7 +1032,7 @@
           <a:lstStyle/>
           <a:p>
             <a:r>
-              <a:rPr lang="en-GB" smtClean="0"/>
+              <a:rPr lang="en-GB"/>
               <a:t>Click to edit Master title style</a:t>
             </a:r>
             <a:endParaRPr lang="en-US"/>
@@ -1051,35 +1061,35 @@
           <a:p>
             <a:pPr lvl="0"/>
             <a:r>
-              <a:rPr lang="en-GB" smtClean="0"/>
+              <a:rPr lang="en-GB"/>
               <a:t>Click to edit Master text styles</a:t>
             </a:r>
           </a:p>
           <a:p>
             <a:pPr lvl="1"/>
             <a:r>
-              <a:rPr lang="en-GB" smtClean="0"/>
+              <a:rPr lang="en-GB"/>
               <a:t>Second level</a:t>
             </a:r>
           </a:p>
           <a:p>
             <a:pPr lvl="2"/>
             <a:r>
-              <a:rPr lang="en-GB" smtClean="0"/>
+              <a:rPr lang="en-GB"/>
               <a:t>Third level</a:t>
             </a:r>
           </a:p>
           <a:p>
             <a:pPr lvl="3"/>
             <a:r>
-              <a:rPr lang="en-GB" smtClean="0"/>
+              <a:rPr lang="en-GB"/>
               <a:t>Fourth level</a:t>
             </a:r>
           </a:p>
           <a:p>
             <a:pPr lvl="4"/>
             <a:r>
-              <a:rPr lang="en-GB" smtClean="0"/>
+              <a:rPr lang="en-GB"/>
               <a:t>Fifth level</a:t>
             </a:r>
             <a:endParaRPr lang="en-US"/>
@@ -1103,7 +1113,7 @@
           <a:p>
             <a:fld id="{07AF7C9C-3FFC-F543-8CD5-56B058077314}" type="datetimeFigureOut">
               <a:rPr lang="en-US" smtClean="0"/>
-              <a:t>16/07/18</a:t>
+              <a:t>9/27/2018</a:t>
             </a:fld>
             <a:endParaRPr lang="en-US"/>
           </a:p>
@@ -1197,7 +1207,7 @@
           <a:lstStyle/>
           <a:p>
             <a:r>
-              <a:rPr lang="en-GB" smtClean="0"/>
+              <a:rPr lang="en-GB"/>
               <a:t>Click to edit Master title style</a:t>
             </a:r>
             <a:endParaRPr lang="en-US"/>
@@ -1221,35 +1231,35 @@
           <a:p>
             <a:pPr lvl="0"/>
             <a:r>
-              <a:rPr lang="en-GB" smtClean="0"/>
+              <a:rPr lang="en-GB"/>
               <a:t>Click to edit Master text styles</a:t>
             </a:r>
           </a:p>
           <a:p>
             <a:pPr lvl="1"/>
             <a:r>
-              <a:rPr lang="en-GB" smtClean="0"/>
+              <a:rPr lang="en-GB"/>
               <a:t>Second level</a:t>
             </a:r>
           </a:p>
           <a:p>
             <a:pPr lvl="2"/>
             <a:r>
-              <a:rPr lang="en-GB" smtClean="0"/>
+              <a:rPr lang="en-GB"/>
               <a:t>Third level</a:t>
             </a:r>
           </a:p>
           <a:p>
             <a:pPr lvl="3"/>
             <a:r>
-              <a:rPr lang="en-GB" smtClean="0"/>
+              <a:rPr lang="en-GB"/>
               <a:t>Fourth level</a:t>
             </a:r>
           </a:p>
           <a:p>
             <a:pPr lvl="4"/>
             <a:r>
-              <a:rPr lang="en-GB" smtClean="0"/>
+              <a:rPr lang="en-GB"/>
               <a:t>Fifth level</a:t>
             </a:r>
             <a:endParaRPr lang="en-US"/>
@@ -1273,7 +1283,7 @@
           <a:p>
             <a:fld id="{07AF7C9C-3FFC-F543-8CD5-56B058077314}" type="datetimeFigureOut">
               <a:rPr lang="en-US" smtClean="0"/>
-              <a:t>16/07/18</a:t>
+              <a:t>9/27/2018</a:t>
             </a:fld>
             <a:endParaRPr lang="en-US"/>
           </a:p>
@@ -1376,7 +1386,7 @@
           </a:lstStyle>
           <a:p>
             <a:r>
-              <a:rPr lang="en-GB" smtClean="0"/>
+              <a:rPr lang="en-GB"/>
               <a:t>Click to edit Master title style</a:t>
             </a:r>
             <a:endParaRPr lang="en-US"/>
@@ -1496,7 +1506,7 @@
           <a:p>
             <a:pPr lvl="0"/>
             <a:r>
-              <a:rPr lang="en-GB" smtClean="0"/>
+              <a:rPr lang="en-GB"/>
               <a:t>Click to edit Master text styles</a:t>
             </a:r>
           </a:p>
@@ -1519,7 +1529,7 @@
           <a:p>
             <a:fld id="{07AF7C9C-3FFC-F543-8CD5-56B058077314}" type="datetimeFigureOut">
               <a:rPr lang="en-US" smtClean="0"/>
-              <a:t>16/07/18</a:t>
+              <a:t>9/27/2018</a:t>
             </a:fld>
             <a:endParaRPr lang="en-US"/>
           </a:p>
@@ -1613,7 +1623,7 @@
           <a:lstStyle/>
           <a:p>
             <a:r>
-              <a:rPr lang="en-GB" smtClean="0"/>
+              <a:rPr lang="en-GB"/>
               <a:t>Click to edit Master title style</a:t>
             </a:r>
             <a:endParaRPr lang="en-US"/>
@@ -1670,35 +1680,35 @@
           <a:p>
             <a:pPr lvl="0"/>
             <a:r>
-              <a:rPr lang="en-GB" smtClean="0"/>
+              <a:rPr lang="en-GB"/>
               <a:t>Click to edit Master text styles</a:t>
             </a:r>
           </a:p>
           <a:p>
             <a:pPr lvl="1"/>
             <a:r>
-              <a:rPr lang="en-GB" smtClean="0"/>
+              <a:rPr lang="en-GB"/>
               <a:t>Second level</a:t>
             </a:r>
           </a:p>
           <a:p>
             <a:pPr lvl="2"/>
             <a:r>
-              <a:rPr lang="en-GB" smtClean="0"/>
+              <a:rPr lang="en-GB"/>
               <a:t>Third level</a:t>
             </a:r>
           </a:p>
           <a:p>
             <a:pPr lvl="3"/>
             <a:r>
-              <a:rPr lang="en-GB" smtClean="0"/>
+              <a:rPr lang="en-GB"/>
               <a:t>Fourth level</a:t>
             </a:r>
           </a:p>
           <a:p>
             <a:pPr lvl="4"/>
             <a:r>
-              <a:rPr lang="en-GB" smtClean="0"/>
+              <a:rPr lang="en-GB"/>
               <a:t>Fifth level</a:t>
             </a:r>
             <a:endParaRPr lang="en-US"/>
@@ -1755,35 +1765,35 @@
           <a:p>
             <a:pPr lvl="0"/>
             <a:r>
-              <a:rPr lang="en-GB" smtClean="0"/>
+              <a:rPr lang="en-GB"/>
               <a:t>Click to edit Master text styles</a:t>
             </a:r>
           </a:p>
           <a:p>
             <a:pPr lvl="1"/>
             <a:r>
-              <a:rPr lang="en-GB" smtClean="0"/>
+              <a:rPr lang="en-GB"/>
               <a:t>Second level</a:t>
             </a:r>
           </a:p>
           <a:p>
             <a:pPr lvl="2"/>
             <a:r>
-              <a:rPr lang="en-GB" smtClean="0"/>
+              <a:rPr lang="en-GB"/>
               <a:t>Third level</a:t>
             </a:r>
           </a:p>
           <a:p>
             <a:pPr lvl="3"/>
             <a:r>
-              <a:rPr lang="en-GB" smtClean="0"/>
+              <a:rPr lang="en-GB"/>
               <a:t>Fourth level</a:t>
             </a:r>
           </a:p>
           <a:p>
             <a:pPr lvl="4"/>
             <a:r>
-              <a:rPr lang="en-GB" smtClean="0"/>
+              <a:rPr lang="en-GB"/>
               <a:t>Fifth level</a:t>
             </a:r>
             <a:endParaRPr lang="en-US"/>
@@ -1807,7 +1817,7 @@
           <a:p>
             <a:fld id="{07AF7C9C-3FFC-F543-8CD5-56B058077314}" type="datetimeFigureOut">
               <a:rPr lang="en-US" smtClean="0"/>
-              <a:t>16/07/18</a:t>
+              <a:t>9/27/2018</a:t>
             </a:fld>
             <a:endParaRPr lang="en-US"/>
           </a:p>
@@ -1905,7 +1915,7 @@
           </a:lstStyle>
           <a:p>
             <a:r>
-              <a:rPr lang="en-GB" smtClean="0"/>
+              <a:rPr lang="en-GB"/>
               <a:t>Click to edit Master title style</a:t>
             </a:r>
             <a:endParaRPr lang="en-US"/>
@@ -1971,7 +1981,7 @@
           <a:p>
             <a:pPr lvl="0"/>
             <a:r>
-              <a:rPr lang="en-GB" smtClean="0"/>
+              <a:rPr lang="en-GB"/>
               <a:t>Click to edit Master text styles</a:t>
             </a:r>
           </a:p>
@@ -2027,35 +2037,35 @@
           <a:p>
             <a:pPr lvl="0"/>
             <a:r>
-              <a:rPr lang="en-GB" smtClean="0"/>
+              <a:rPr lang="en-GB"/>
               <a:t>Click to edit Master text styles</a:t>
             </a:r>
           </a:p>
           <a:p>
             <a:pPr lvl="1"/>
             <a:r>
-              <a:rPr lang="en-GB" smtClean="0"/>
+              <a:rPr lang="en-GB"/>
               <a:t>Second level</a:t>
             </a:r>
           </a:p>
           <a:p>
             <a:pPr lvl="2"/>
             <a:r>
-              <a:rPr lang="en-GB" smtClean="0"/>
+              <a:rPr lang="en-GB"/>
               <a:t>Third level</a:t>
             </a:r>
           </a:p>
           <a:p>
             <a:pPr lvl="3"/>
             <a:r>
-              <a:rPr lang="en-GB" smtClean="0"/>
+              <a:rPr lang="en-GB"/>
               <a:t>Fourth level</a:t>
             </a:r>
           </a:p>
           <a:p>
             <a:pPr lvl="4"/>
             <a:r>
-              <a:rPr lang="en-GB" smtClean="0"/>
+              <a:rPr lang="en-GB"/>
               <a:t>Fifth level</a:t>
             </a:r>
             <a:endParaRPr lang="en-US"/>
@@ -2121,7 +2131,7 @@
           <a:p>
             <a:pPr lvl="0"/>
             <a:r>
-              <a:rPr lang="en-GB" smtClean="0"/>
+              <a:rPr lang="en-GB"/>
               <a:t>Click to edit Master text styles</a:t>
             </a:r>
           </a:p>
@@ -2177,35 +2187,35 @@
           <a:p>
             <a:pPr lvl="0"/>
             <a:r>
-              <a:rPr lang="en-GB" smtClean="0"/>
+              <a:rPr lang="en-GB"/>
               <a:t>Click to edit Master text styles</a:t>
             </a:r>
           </a:p>
           <a:p>
             <a:pPr lvl="1"/>
             <a:r>
-              <a:rPr lang="en-GB" smtClean="0"/>
+              <a:rPr lang="en-GB"/>
               <a:t>Second level</a:t>
             </a:r>
           </a:p>
           <a:p>
             <a:pPr lvl="2"/>
             <a:r>
-              <a:rPr lang="en-GB" smtClean="0"/>
+              <a:rPr lang="en-GB"/>
               <a:t>Third level</a:t>
             </a:r>
           </a:p>
           <a:p>
             <a:pPr lvl="3"/>
             <a:r>
-              <a:rPr lang="en-GB" smtClean="0"/>
+              <a:rPr lang="en-GB"/>
               <a:t>Fourth level</a:t>
             </a:r>
           </a:p>
           <a:p>
             <a:pPr lvl="4"/>
             <a:r>
-              <a:rPr lang="en-GB" smtClean="0"/>
+              <a:rPr lang="en-GB"/>
               <a:t>Fifth level</a:t>
             </a:r>
             <a:endParaRPr lang="en-US"/>
@@ -2229,7 +2239,7 @@
           <a:p>
             <a:fld id="{07AF7C9C-3FFC-F543-8CD5-56B058077314}" type="datetimeFigureOut">
               <a:rPr lang="en-US" smtClean="0"/>
-              <a:t>16/07/18</a:t>
+              <a:t>9/27/2018</a:t>
             </a:fld>
             <a:endParaRPr lang="en-US"/>
           </a:p>
@@ -2323,7 +2333,7 @@
           <a:lstStyle/>
           <a:p>
             <a:r>
-              <a:rPr lang="en-GB" smtClean="0"/>
+              <a:rPr lang="en-GB"/>
               <a:t>Click to edit Master title style</a:t>
             </a:r>
             <a:endParaRPr lang="en-US"/>
@@ -2347,7 +2357,7 @@
           <a:p>
             <a:fld id="{07AF7C9C-3FFC-F543-8CD5-56B058077314}" type="datetimeFigureOut">
               <a:rPr lang="en-US" smtClean="0"/>
-              <a:t>16/07/18</a:t>
+              <a:t>9/27/2018</a:t>
             </a:fld>
             <a:endParaRPr lang="en-US"/>
           </a:p>
@@ -2442,7 +2452,7 @@
           <a:p>
             <a:fld id="{07AF7C9C-3FFC-F543-8CD5-56B058077314}" type="datetimeFigureOut">
               <a:rPr lang="en-US" smtClean="0"/>
-              <a:t>16/07/18</a:t>
+              <a:t>9/27/2018</a:t>
             </a:fld>
             <a:endParaRPr lang="en-US"/>
           </a:p>
@@ -2545,7 +2555,7 @@
           </a:lstStyle>
           <a:p>
             <a:r>
-              <a:rPr lang="en-GB" smtClean="0"/>
+              <a:rPr lang="en-GB"/>
               <a:t>Click to edit Master title style</a:t>
             </a:r>
             <a:endParaRPr lang="en-US"/>
@@ -2602,35 +2612,35 @@
           <a:p>
             <a:pPr lvl="0"/>
             <a:r>
-              <a:rPr lang="en-GB" smtClean="0"/>
+              <a:rPr lang="en-GB"/>
               <a:t>Click to edit Master text styles</a:t>
             </a:r>
           </a:p>
           <a:p>
             <a:pPr lvl="1"/>
             <a:r>
-              <a:rPr lang="en-GB" smtClean="0"/>
+              <a:rPr lang="en-GB"/>
               <a:t>Second level</a:t>
             </a:r>
           </a:p>
           <a:p>
             <a:pPr lvl="2"/>
             <a:r>
-              <a:rPr lang="en-GB" smtClean="0"/>
+              <a:rPr lang="en-GB"/>
               <a:t>Third level</a:t>
             </a:r>
           </a:p>
           <a:p>
             <a:pPr lvl="3"/>
             <a:r>
-              <a:rPr lang="en-GB" smtClean="0"/>
+              <a:rPr lang="en-GB"/>
               <a:t>Fourth level</a:t>
             </a:r>
           </a:p>
           <a:p>
             <a:pPr lvl="4"/>
             <a:r>
-              <a:rPr lang="en-GB" smtClean="0"/>
+              <a:rPr lang="en-GB"/>
               <a:t>Fifth level</a:t>
             </a:r>
             <a:endParaRPr lang="en-US"/>
@@ -2696,7 +2706,7 @@
           <a:p>
             <a:pPr lvl="0"/>
             <a:r>
-              <a:rPr lang="en-GB" smtClean="0"/>
+              <a:rPr lang="en-GB"/>
               <a:t>Click to edit Master text styles</a:t>
             </a:r>
           </a:p>
@@ -2719,7 +2729,7 @@
           <a:p>
             <a:fld id="{07AF7C9C-3FFC-F543-8CD5-56B058077314}" type="datetimeFigureOut">
               <a:rPr lang="en-US" smtClean="0"/>
-              <a:t>16/07/18</a:t>
+              <a:t>9/27/2018</a:t>
             </a:fld>
             <a:endParaRPr lang="en-US"/>
           </a:p>
@@ -2822,7 +2832,7 @@
           </a:lstStyle>
           <a:p>
             <a:r>
-              <a:rPr lang="en-GB" smtClean="0"/>
+              <a:rPr lang="en-GB"/>
               <a:t>Click to edit Master title style</a:t>
             </a:r>
             <a:endParaRPr lang="en-US"/>
@@ -2949,7 +2959,7 @@
           <a:p>
             <a:pPr lvl="0"/>
             <a:r>
-              <a:rPr lang="en-GB" smtClean="0"/>
+              <a:rPr lang="en-GB"/>
               <a:t>Click to edit Master text styles</a:t>
             </a:r>
           </a:p>
@@ -2972,7 +2982,7 @@
           <a:p>
             <a:fld id="{07AF7C9C-3FFC-F543-8CD5-56B058077314}" type="datetimeFigureOut">
               <a:rPr lang="en-US" smtClean="0"/>
-              <a:t>16/07/18</a:t>
+              <a:t>9/27/2018</a:t>
             </a:fld>
             <a:endParaRPr lang="en-US"/>
           </a:p>
@@ -3081,7 +3091,7 @@
           <a:lstStyle/>
           <a:p>
             <a:r>
-              <a:rPr lang="en-GB" smtClean="0"/>
+              <a:rPr lang="en-GB"/>
               <a:t>Click to edit Master title style</a:t>
             </a:r>
             <a:endParaRPr lang="en-US"/>
@@ -3115,35 +3125,35 @@
           <a:p>
             <a:pPr lvl="0"/>
             <a:r>
-              <a:rPr lang="en-GB" smtClean="0"/>
+              <a:rPr lang="en-GB"/>
               <a:t>Click to edit Master text styles</a:t>
             </a:r>
           </a:p>
           <a:p>
             <a:pPr lvl="1"/>
             <a:r>
-              <a:rPr lang="en-GB" smtClean="0"/>
+              <a:rPr lang="en-GB"/>
               <a:t>Second level</a:t>
             </a:r>
           </a:p>
           <a:p>
             <a:pPr lvl="2"/>
             <a:r>
-              <a:rPr lang="en-GB" smtClean="0"/>
+              <a:rPr lang="en-GB"/>
               <a:t>Third level</a:t>
             </a:r>
           </a:p>
           <a:p>
             <a:pPr lvl="3"/>
             <a:r>
-              <a:rPr lang="en-GB" smtClean="0"/>
+              <a:rPr lang="en-GB"/>
               <a:t>Fourth level</a:t>
             </a:r>
           </a:p>
           <a:p>
             <a:pPr lvl="4"/>
             <a:r>
-              <a:rPr lang="en-GB" smtClean="0"/>
+              <a:rPr lang="en-GB"/>
               <a:t>Fifth level</a:t>
             </a:r>
             <a:endParaRPr lang="en-US"/>
@@ -3185,7 +3195,7 @@
           <a:p>
             <a:fld id="{07AF7C9C-3FFC-F543-8CD5-56B058077314}" type="datetimeFigureOut">
               <a:rPr lang="en-US" smtClean="0"/>
-              <a:t>16/07/18</a:t>
+              <a:t>9/27/2018</a:t>
             </a:fld>
             <a:endParaRPr lang="en-US"/>
           </a:p>
@@ -3573,6 +3583,47 @@
       </p:grpSpPr>
       <p:sp>
         <p:nvSpPr>
+          <p:cNvPr id="10" name="footprint"/>
+          <p:cNvSpPr/>
+          <p:nvPr/>
+        </p:nvSpPr>
+        <p:spPr>
+          <a:xfrm>
+            <a:off x="2591381" y="1662018"/>
+            <a:ext cx="80881" cy="77368"/>
+          </a:xfrm>
+          <a:prstGeom prst="ellipse">
+            <a:avLst/>
+          </a:prstGeom>
+          <a:solidFill>
+            <a:srgbClr val="F68222"/>
+          </a:solidFill>
+        </p:spPr>
+        <p:style>
+          <a:lnRef idx="1">
+            <a:schemeClr val="accent1"/>
+          </a:lnRef>
+          <a:fillRef idx="3">
+            <a:schemeClr val="accent1"/>
+          </a:fillRef>
+          <a:effectRef idx="2">
+            <a:schemeClr val="accent1"/>
+          </a:effectRef>
+          <a:fontRef idx="minor">
+            <a:schemeClr val="lt1"/>
+          </a:fontRef>
+        </p:style>
+        <p:txBody>
+          <a:bodyPr rtlCol="0" anchor="ctr"/>
+          <a:lstStyle/>
+          <a:p>
+            <a:pPr algn="ctr"/>
+            <a:endParaRPr lang="en-US"/>
+          </a:p>
+        </p:txBody>
+      </p:sp>
+      <p:sp>
+        <p:nvSpPr>
           <p:cNvPr id="2" name="map"/>
           <p:cNvSpPr/>
           <p:nvPr/>
@@ -3587,7 +3638,9 @@
           </a:prstGeom>
           <a:noFill/>
           <a:ln>
-            <a:noFill/>
+            <a:solidFill>
+              <a:schemeClr val="tx1"/>
+            </a:solidFill>
           </a:ln>
         </p:spPr>
         <p:style>
@@ -3786,7 +3839,7 @@
           <a:lstStyle/>
           <a:p>
             <a:r>
-              <a:rPr lang="en-US" sz="2000" dirty="0" smtClean="0">
+              <a:rPr lang="en-US" sz="2000" dirty="0">
                 <a:solidFill>
                   <a:schemeClr val="bg1"/>
                 </a:solidFill>
@@ -3797,7 +3850,7 @@
               <a:t>Enter Trail</a:t>
             </a:r>
             <a:r>
-              <a:rPr lang="mr-IN" sz="2000" dirty="0" smtClean="0">
+              <a:rPr lang="mr-IN" sz="2000" dirty="0">
                 <a:solidFill>
                   <a:schemeClr val="bg1"/>
                 </a:solidFill>
@@ -3806,7 +3859,7 @@
               </a:rPr>
               <a:t>…</a:t>
             </a:r>
-            <a:endParaRPr lang="en-US" sz="2000" dirty="0" smtClean="0">
+            <a:endParaRPr lang="en-US" sz="2000" dirty="0">
               <a:solidFill>
                 <a:schemeClr val="bg1"/>
               </a:solidFill>
@@ -3825,7 +3878,7 @@
             </a:endParaRPr>
           </a:p>
           <a:p>
-            <a:endParaRPr lang="en-US" sz="2000" dirty="0" smtClean="0">
+            <a:endParaRPr lang="en-US" sz="2000" dirty="0">
               <a:solidFill>
                 <a:schemeClr val="bg1"/>
               </a:solidFill>
@@ -3859,7 +3912,7 @@
           <a:lstStyle/>
           <a:p>
             <a:r>
-              <a:rPr lang="en-US" b="1" dirty="0" smtClean="0">
+              <a:rPr lang="en-US" b="1" dirty="0">
                 <a:solidFill>
                   <a:srgbClr val="00B0F0"/>
                 </a:solidFill>
@@ -3869,14 +3922,6 @@
               </a:rPr>
               <a:t>TIMER</a:t>
             </a:r>
-            <a:endParaRPr lang="en-US" b="1" dirty="0">
-              <a:solidFill>
-                <a:srgbClr val="00B0F0"/>
-              </a:solidFill>
-              <a:latin typeface="Open Sans" panose="020B0606030504020204" pitchFamily="34" charset="0"/>
-              <a:ea typeface="Open Sans" panose="020B0606030504020204" pitchFamily="34" charset="0"/>
-              <a:cs typeface="Open Sans" panose="020B0606030504020204" pitchFamily="34" charset="0"/>
-            </a:endParaRPr>
           </a:p>
         </p:txBody>
       </p:sp>
@@ -3903,7 +3948,7 @@
           <a:lstStyle/>
           <a:p>
             <a:r>
-              <a:rPr lang="en-US" b="1" dirty="0" smtClean="0">
+              <a:rPr lang="en-US" b="1" dirty="0">
                 <a:solidFill>
                   <a:srgbClr val="00B0F0"/>
                 </a:solidFill>
@@ -3913,14 +3958,6 @@
               </a:rPr>
               <a:t>EVENTS</a:t>
             </a:r>
-            <a:endParaRPr lang="en-US" b="1" dirty="0">
-              <a:solidFill>
-                <a:srgbClr val="00B0F0"/>
-              </a:solidFill>
-              <a:latin typeface="Open Sans" panose="020B0606030504020204" pitchFamily="34" charset="0"/>
-              <a:ea typeface="Open Sans" panose="020B0606030504020204" pitchFamily="34" charset="0"/>
-              <a:cs typeface="Open Sans" panose="020B0606030504020204" pitchFamily="34" charset="0"/>
-            </a:endParaRPr>
           </a:p>
         </p:txBody>
       </p:sp>
@@ -4139,7 +4176,7 @@
           <a:lstStyle/>
           <a:p>
             <a:r>
-              <a:rPr lang="en-US" sz="2800" b="1" dirty="0" smtClean="0">
+              <a:rPr lang="en-US" sz="2800" b="1" dirty="0">
                 <a:solidFill>
                   <a:schemeClr val="bg1"/>
                 </a:solidFill>
@@ -4152,7 +4189,7 @@
           </a:p>
           <a:p>
             <a:r>
-              <a:rPr lang="en-US" sz="2800" b="1" dirty="0" smtClean="0">
+              <a:rPr lang="en-US" sz="2800" b="1" dirty="0">
                 <a:solidFill>
                   <a:schemeClr val="bg1"/>
                 </a:solidFill>
@@ -4162,14 +4199,6 @@
               </a:rPr>
               <a:t>2018. RACE 2A</a:t>
             </a:r>
-            <a:endParaRPr lang="en-US" sz="2800" b="1" dirty="0">
-              <a:solidFill>
-                <a:schemeClr val="bg1"/>
-              </a:solidFill>
-              <a:latin typeface="Open Sans" panose="020B0606030504020204" pitchFamily="34" charset="0"/>
-              <a:ea typeface="Open Sans" panose="020B0606030504020204" pitchFamily="34" charset="0"/>
-              <a:cs typeface="Open Sans" panose="020B0606030504020204" pitchFamily="34" charset="0"/>
-            </a:endParaRPr>
           </a:p>
         </p:txBody>
       </p:sp>
@@ -4254,7 +4283,7 @@
           <a:prstGeom prst="wedgeRectCallout">
             <a:avLst>
               <a:gd name="adj1" fmla="val 48987"/>
-              <a:gd name="adj2" fmla="val 66274"/>
+              <a:gd name="adj2" fmla="val 96273"/>
             </a:avLst>
           </a:prstGeom>
           <a:solidFill>
@@ -4289,7 +4318,7 @@
           <a:p>
             <a:pPr algn="ctr"/>
             <a:r>
-              <a:rPr lang="en-US" sz="1400" b="1" dirty="0" smtClean="0">
+              <a:rPr lang="en-US" sz="1400" b="1" dirty="0">
                 <a:solidFill>
                   <a:sysClr val="windowText" lastClr="000000"/>
                 </a:solidFill>
@@ -4298,13 +4327,6 @@
               </a:rPr>
               <a:t>AAAA</a:t>
             </a:r>
-            <a:endParaRPr lang="en-US" sz="1400" b="1" dirty="0">
-              <a:solidFill>
-                <a:sysClr val="windowText" lastClr="000000"/>
-              </a:solidFill>
-              <a:latin typeface="Courier New"/>
-              <a:cs typeface="Courier New"/>
-            </a:endParaRPr>
           </a:p>
         </p:txBody>
       </p:sp>
@@ -4321,7 +4343,7 @@
   <p:timing>
     <p:tnLst>
       <p:par>
-        <p:cTn xmlns:p14="http://schemas.microsoft.com/office/powerpoint/2010/main" id="1" dur="indefinite" restart="never" nodeType="tmRoot">
+        <p:cTn id="1" dur="indefinite" restart="never" nodeType="tmRoot">
           <p:childTnLst>
             <p:seq concurrent="1" nextAc="seek">
               <p:cTn id="2" dur="indefinite" nodeType="mainSeq">
@@ -5006,7 +5028,7 @@
   <a:extraClrSchemeLst/>
   <a:extLst>
     <a:ext uri="{05A4C25C-085E-4340-85A3-A5531E510DB2}">
-      <thm15:themeFamily xmlns:thm15="http://schemas.microsoft.com/office/thememl/2012/main" xmlns="" name="Office Theme" id="{62F939B6-93AF-4DB8-9C6B-D6C7DFDC589F}" vid="{4A3C46E8-61CC-4603-A589-7422A47A8E4A}"/>
+      <thm15:themeFamily xmlns:thm15="http://schemas.microsoft.com/office/thememl/2012/main" name="Office Theme" id="{62F939B6-93AF-4DB8-9C6B-D6C7DFDC589F}" vid="{4A3C46E8-61CC-4603-A589-7422A47A8E4A}"/>
     </a:ext>
   </a:extLst>
 </a:theme>

</xml_diff>

<commit_message>
Footprints working for the tracks_data given.
</commit_message>
<xml_diff>
--- a/master_template.pptx
+++ b/master_template.pptx
@@ -3583,7 +3583,7 @@
       </p:grpSpPr>
       <p:sp>
         <p:nvSpPr>
-          <p:cNvPr id="10" name="footprint"/>
+          <p:cNvPr id="2000" name="footprint"/>
           <p:cNvSpPr/>
           <p:nvPr/>
         </p:nvSpPr>
@@ -3638,9 +3638,7 @@
           </a:prstGeom>
           <a:noFill/>
           <a:ln>
-            <a:solidFill>
-              <a:schemeClr val="tx1"/>
-            </a:solidFill>
+            <a:noFill/>
           </a:ln>
         </p:spPr>
         <p:style>
@@ -4104,11 +4102,7 @@
         </p:nvPicPr>
         <p:blipFill>
           <a:blip r:embed="rId3">
-            <a:extLst>
-              <a:ext uri="{28A0092B-C50C-407E-A947-70E740481C1C}">
-                <a14:useLocalDpi xmlns:a14="http://schemas.microsoft.com/office/drawing/2010/main" val="0"/>
-              </a:ext>
-            </a:extLst>
+            <a:extLst/>
           </a:blip>
           <a:stretch>
             <a:fillRect/>
@@ -4134,11 +4128,7 @@
         </p:nvPicPr>
         <p:blipFill>
           <a:blip r:embed="rId4">
-            <a:extLst>
-              <a:ext uri="{28A0092B-C50C-407E-A947-70E740481C1C}">
-                <a14:useLocalDpi xmlns:a14="http://schemas.microsoft.com/office/drawing/2010/main" val="0"/>
-              </a:ext>
-            </a:extLst>
+            <a:extLst/>
           </a:blip>
           <a:stretch>
             <a:fillRect/>
@@ -4249,11 +4239,7 @@
         </p:nvPicPr>
         <p:blipFill>
           <a:blip r:embed="rId5">
-            <a:extLst>
-              <a:ext uri="{28A0092B-C50C-407E-A947-70E740481C1C}">
-                <a14:useLocalDpi xmlns:a14="http://schemas.microsoft.com/office/drawing/2010/main" val="0"/>
-              </a:ext>
-            </a:extLst>
+            <a:extLst/>
           </a:blip>
           <a:stretch>
             <a:fillRect/>
@@ -4283,7 +4269,7 @@
           <a:prstGeom prst="wedgeRectCallout">
             <a:avLst>
               <a:gd name="adj1" fmla="val 48987"/>
-              <a:gd name="adj2" fmla="val 96273"/>
+              <a:gd name="adj2" fmla="val 66274"/>
             </a:avLst>
           </a:prstGeom>
           <a:solidFill>

</xml_diff>